<commit_message>
Gaussian weighted 2d kde
</commit_message>
<xml_diff>
--- a/Vis2_template_data.pptx
+++ b/Vis2_template_data.pptx
@@ -27,9 +27,13 @@
       <p:italic r:id="rId11"/>
       <p:boldItalic r:id="rId12"/>
     </p:embeddedFont>
+    <p:embeddedFont>
+      <p:font typeface="Cambria Math" panose="02040503050406030204" pitchFamily="18" charset="0"/>
+      <p:regular r:id="rId13"/>
+    </p:embeddedFont>
   </p:embeddedFontLst>
   <p:custDataLst>
-    <p:tags r:id="rId13"/>
+    <p:tags r:id="rId14"/>
   </p:custDataLst>
   <p:kinsoku lang="ja-JP" invalStChars="、。，．・：；？！゛゜ヽヾゝゞ々ー’”）〕］｝〉》」』】°‰′″℃￠％ぁぃぅぇぉっゃゅょゎァィゥェォッャュョヮヵヶ!%),.:;?]}｡｣､･ｧｨｩｪｫｬｭｮｯｰﾞﾟ" invalEndChars="‘“（〔［｛〈《「『【￥＄$([\{｢￡"/>
   <p:defaultTextStyle>
@@ -158,6 +162,23 @@
     </a:lvl9pPr>
   </p:defaultTextStyle>
   <p:extLst>
+    <p:ext uri="{521415D9-36F7-43E2-AB2F-B90AF26B5E84}">
+      <p14:sectionLst xmlns:p14="http://schemas.microsoft.com/office/powerpoint/2010/main">
+        <p14:section name="Default Section" id="{BFA7BB45-4DCB-40D1-9602-371BD49F25C3}">
+          <p14:sldIdLst>
+            <p14:sldId id="317"/>
+          </p14:sldIdLst>
+        </p14:section>
+        <p14:section name="Untitled Section" id="{F5E072F3-C99A-41D9-B760-9A342D7D8CEE}">
+          <p14:sldIdLst>
+            <p14:sldId id="404"/>
+            <p14:sldId id="406"/>
+            <p14:sldId id="407"/>
+            <p14:sldId id="405"/>
+          </p14:sldIdLst>
+        </p14:section>
+      </p14:sectionLst>
+    </p:ext>
     <p:ext uri="{EFAFB233-063F-42B5-8137-9DF3F51BA10A}">
       <p15:sldGuideLst xmlns:p15="http://schemas.microsoft.com/office/powerpoint/2012/main">
         <p15:guide id="1" orient="horz" pos="4248" userDrawn="1">
@@ -337,35 +358,35 @@
           <a:p>
             <a:pPr lvl="0"/>
             <a:r>
-              <a:rPr lang="de-DE" noProof="0" smtClean="0"/>
+              <a:rPr lang="de-DE" noProof="0"/>
               <a:t>Click to edit Master notes styles</a:t>
             </a:r>
           </a:p>
           <a:p>
             <a:pPr lvl="1"/>
             <a:r>
-              <a:rPr lang="de-DE" noProof="0" smtClean="0"/>
+              <a:rPr lang="de-DE" noProof="0"/>
               <a:t>Second Level</a:t>
             </a:r>
           </a:p>
           <a:p>
             <a:pPr lvl="2"/>
             <a:r>
-              <a:rPr lang="de-DE" noProof="0" smtClean="0"/>
+              <a:rPr lang="de-DE" noProof="0"/>
               <a:t>Third Level</a:t>
             </a:r>
           </a:p>
           <a:p>
             <a:pPr lvl="3"/>
             <a:r>
-              <a:rPr lang="de-DE" noProof="0" smtClean="0"/>
+              <a:rPr lang="de-DE" noProof="0"/>
               <a:t>Fourth Level</a:t>
             </a:r>
           </a:p>
           <a:p>
             <a:pPr lvl="4"/>
             <a:r>
-              <a:rPr lang="de-DE" noProof="0" smtClean="0"/>
+              <a:rPr lang="de-DE" noProof="0"/>
               <a:t>Fifth Level</a:t>
             </a:r>
           </a:p>
@@ -688,22 +709,22 @@
           <a:lstStyle/>
           <a:p>
             <a:r>
-              <a:rPr lang="en-US" dirty="0" smtClean="0"/>
+              <a:rPr lang="en-US" dirty="0"/>
               <a:t>Describe the data you plan to implement </a:t>
             </a:r>
           </a:p>
           <a:p>
             <a:r>
-              <a:rPr lang="en-US" baseline="0" dirty="0" smtClean="0"/>
+              <a:rPr lang="en-US" baseline="0" dirty="0"/>
               <a:t>List the questions you plan to answer using visualization </a:t>
             </a:r>
           </a:p>
           <a:p>
-            <a:endParaRPr lang="en-US" baseline="0" dirty="0" smtClean="0"/>
+            <a:endParaRPr lang="en-US" baseline="0" dirty="0"/>
           </a:p>
           <a:p>
             <a:r>
-              <a:rPr lang="en-US" baseline="0" dirty="0" smtClean="0"/>
+              <a:rPr lang="en-US" baseline="0" dirty="0"/>
               <a:t>~ 1 minute</a:t>
             </a:r>
             <a:endParaRPr lang="en-US" dirty="0"/>
@@ -768,30 +789,30 @@
           <a:lstStyle/>
           <a:p>
             <a:r>
-              <a:rPr lang="en-US" dirty="0" smtClean="0"/>
+              <a:rPr lang="en-US" dirty="0"/>
               <a:t>Summarize the algorithms and concepts of</a:t>
             </a:r>
             <a:r>
-              <a:rPr lang="en-US" baseline="0" dirty="0" smtClean="0"/>
+              <a:rPr lang="en-US" baseline="0" dirty="0"/>
               <a:t> the technique (described in a paper or elsewhere) you plan to implement to analyze your data. </a:t>
             </a:r>
           </a:p>
           <a:p>
             <a:r>
-              <a:rPr lang="en-US" baseline="0" dirty="0" smtClean="0"/>
+              <a:rPr lang="en-US" baseline="0" dirty="0"/>
               <a:t>If space is available, put some representative image here. </a:t>
             </a:r>
-            <a:endParaRPr lang="en-US" dirty="0" smtClean="0"/>
+            <a:endParaRPr lang="en-US" dirty="0"/>
           </a:p>
           <a:p>
-            <a:endParaRPr lang="en-US" dirty="0" smtClean="0"/>
+            <a:endParaRPr lang="en-US" dirty="0"/>
           </a:p>
           <a:p>
-            <a:endParaRPr lang="en-US" baseline="0" dirty="0" smtClean="0"/>
+            <a:endParaRPr lang="en-US" baseline="0" dirty="0"/>
           </a:p>
           <a:p>
             <a:r>
-              <a:rPr lang="en-US" baseline="0" dirty="0" smtClean="0"/>
+              <a:rPr lang="en-US" baseline="0" dirty="0"/>
               <a:t>~1 minute</a:t>
             </a:r>
             <a:endParaRPr lang="en-US" dirty="0"/>
@@ -856,60 +877,60 @@
           <a:lstStyle/>
           <a:p>
             <a:r>
-              <a:rPr lang="en-US" baseline="0" dirty="0" smtClean="0"/>
+              <a:rPr lang="en-US" baseline="0" dirty="0"/>
               <a:t>You do not need to and often should not stick 100% to the algorithm described in a paper. </a:t>
             </a:r>
           </a:p>
           <a:p>
             <a:r>
-              <a:rPr lang="en-US" baseline="0" dirty="0" smtClean="0"/>
+              <a:rPr lang="en-US" baseline="0" dirty="0"/>
               <a:t>If you do not stick closely to a paper, describe what you omit and / or what you will implement additionally. </a:t>
             </a:r>
           </a:p>
           <a:p>
             <a:r>
-              <a:rPr lang="en-US" baseline="0" dirty="0" smtClean="0"/>
+              <a:rPr lang="en-US" baseline="0" dirty="0"/>
               <a:t>The design and implementation effort should be proportional to the lab ECTS! Take existing libraries and online examples into account when estimating your effort!</a:t>
             </a:r>
-            <a:endParaRPr lang="en-US" dirty="0" smtClean="0"/>
+            <a:endParaRPr lang="en-US" dirty="0"/>
           </a:p>
           <a:p>
-            <a:endParaRPr lang="en-US" dirty="0" smtClean="0"/>
+            <a:endParaRPr lang="en-US" dirty="0"/>
           </a:p>
           <a:p>
             <a:r>
-              <a:rPr lang="en-US" dirty="0" smtClean="0"/>
+              <a:rPr lang="en-US" dirty="0"/>
               <a:t>Describe how you plan to implement the work</a:t>
             </a:r>
             <a:r>
-              <a:rPr lang="en-US" baseline="0" dirty="0" smtClean="0"/>
+              <a:rPr lang="en-US" baseline="0" dirty="0"/>
               <a:t>: which visualization or graphics libraries do you plan to use? </a:t>
             </a:r>
           </a:p>
           <a:p>
             <a:r>
-              <a:rPr lang="en-US" baseline="0" dirty="0" smtClean="0"/>
+              <a:rPr lang="en-US" baseline="0" dirty="0"/>
               <a:t>Which data preprocessing steps are necessary and which libraries do you plan to use? </a:t>
             </a:r>
           </a:p>
           <a:p>
-            <a:endParaRPr lang="en-US" baseline="0" dirty="0" smtClean="0"/>
+            <a:endParaRPr lang="en-US" baseline="0" dirty="0"/>
           </a:p>
           <a:p>
             <a:r>
-              <a:rPr lang="en-US" baseline="0" dirty="0" smtClean="0"/>
+              <a:rPr lang="en-US" baseline="0" dirty="0"/>
               <a:t>If you have any open questions, put them here!  </a:t>
             </a:r>
           </a:p>
           <a:p>
-            <a:endParaRPr lang="en-US" baseline="0" dirty="0" smtClean="0"/>
+            <a:endParaRPr lang="en-US" baseline="0" dirty="0"/>
           </a:p>
           <a:p>
-            <a:endParaRPr lang="en-US" baseline="0" dirty="0" smtClean="0"/>
+            <a:endParaRPr lang="en-US" baseline="0" dirty="0"/>
           </a:p>
           <a:p>
             <a:r>
-              <a:rPr lang="en-US" baseline="0" dirty="0" smtClean="0"/>
+              <a:rPr lang="en-US" baseline="0" dirty="0"/>
               <a:t>~1 minute</a:t>
             </a:r>
           </a:p>
@@ -973,31 +994,31 @@
           <a:lstStyle/>
           <a:p>
             <a:r>
-              <a:rPr lang="en-US" dirty="0" smtClean="0"/>
+              <a:rPr lang="en-US" dirty="0"/>
               <a:t>This is the last</a:t>
             </a:r>
             <a:r>
-              <a:rPr lang="en-US" baseline="0" dirty="0" smtClean="0"/>
+              <a:rPr lang="en-US" baseline="0" dirty="0"/>
               <a:t> slide that remains visible until the next group comes up. </a:t>
             </a:r>
           </a:p>
           <a:p>
             <a:r>
-              <a:rPr lang="en-US" baseline="0" dirty="0" smtClean="0"/>
+              <a:rPr lang="en-US" baseline="0" dirty="0"/>
               <a:t>If you plan to </a:t>
             </a:r>
             <a:r>
-              <a:rPr lang="en-US" baseline="0" dirty="0" err="1" smtClean="0"/>
+              <a:rPr lang="en-US" baseline="0" dirty="0" err="1"/>
               <a:t>reimplement</a:t>
             </a:r>
             <a:r>
-              <a:rPr lang="en-US" baseline="0" dirty="0" smtClean="0"/>
+              <a:rPr lang="en-US" baseline="0" dirty="0"/>
               <a:t> a paper, put the details here. Otherwise remove this text. </a:t>
             </a:r>
           </a:p>
           <a:p>
             <a:r>
-              <a:rPr lang="en-US" baseline="0" dirty="0" smtClean="0"/>
+              <a:rPr lang="en-US" baseline="0" dirty="0"/>
               <a:t>Nothing to say here. </a:t>
             </a:r>
             <a:endParaRPr lang="en-US" dirty="0"/>
@@ -12744,7 +12765,7 @@
           </a:lstStyle>
           <a:p>
             <a:r>
-              <a:rPr lang="de-AT" kern="0" dirty="0" smtClean="0">
+              <a:rPr lang="de-AT" kern="0" dirty="0">
                 <a:solidFill>
                   <a:srgbClr val="5F5F5F"/>
                 </a:solidFill>
@@ -12752,7 +12773,7 @@
               <a:t>Click to edit Master affiliation</a:t>
             </a:r>
             <a:r>
-              <a:rPr lang="de-AT" kern="0" baseline="0" dirty="0" smtClean="0">
+              <a:rPr lang="de-AT" kern="0" baseline="0" dirty="0">
                 <a:solidFill>
                   <a:srgbClr val="5F5F5F"/>
                 </a:solidFill>
@@ -12760,18 +12781,13 @@
               <a:t> </a:t>
             </a:r>
             <a:r>
-              <a:rPr lang="de-AT" kern="0" dirty="0" smtClean="0">
+              <a:rPr lang="de-AT" kern="0" dirty="0">
                 <a:solidFill>
                   <a:srgbClr val="5F5F5F"/>
                 </a:solidFill>
               </a:rPr>
               <a:t>style</a:t>
             </a:r>
-            <a:endParaRPr lang="de-AT" kern="0" dirty="0">
-              <a:solidFill>
-                <a:srgbClr val="5F5F5F"/>
-              </a:solidFill>
-            </a:endParaRPr>
           </a:p>
         </p:txBody>
       </p:sp>
@@ -12810,21 +12826,6 @@
   <p:clrMapOvr>
     <a:masterClrMapping/>
   </p:clrMapOvr>
-  <mc:AlternateContent xmlns:mc="http://schemas.openxmlformats.org/markup-compatibility/2006" xmlns:p14="http://schemas.microsoft.com/office/powerpoint/2010/main">
-    <mc:Choice Requires="p14">
-      <p:transition p14:dur="0"/>
-    </mc:Choice>
-    <mc:Fallback xmlns="">
-      <p:transition/>
-    </mc:Fallback>
-  </mc:AlternateContent>
-  <p:timing>
-    <p:tnLst>
-      <p:par>
-        <p:cTn id="1" dur="indefinite" restart="never" nodeType="tmRoot"/>
-      </p:par>
-    </p:tnLst>
-  </p:timing>
 </p:sldLayout>
 </file>
 
@@ -12866,7 +12867,7 @@
           <a:lstStyle/>
           <a:p>
             <a:r>
-              <a:rPr lang="en-US" dirty="0" smtClean="0"/>
+              <a:rPr lang="en-US" dirty="0"/>
               <a:t>Click to edit Master title style</a:t>
             </a:r>
             <a:endParaRPr lang="de-AT" dirty="0"/>
@@ -12894,28 +12895,28 @@
           <a:p>
             <a:pPr lvl="0"/>
             <a:r>
-              <a:rPr lang="en-US" dirty="0" smtClean="0"/>
+              <a:rPr lang="en-US" dirty="0"/>
               <a:t>Click to edit Master text styles</a:t>
             </a:r>
           </a:p>
           <a:p>
             <a:pPr lvl="1"/>
             <a:r>
-              <a:rPr lang="en-US" dirty="0" smtClean="0"/>
+              <a:rPr lang="en-US" dirty="0"/>
               <a:t>Second level</a:t>
             </a:r>
           </a:p>
           <a:p>
             <a:pPr lvl="2"/>
             <a:r>
-              <a:rPr lang="en-US" dirty="0" smtClean="0"/>
+              <a:rPr lang="en-US" dirty="0"/>
               <a:t>Third level</a:t>
             </a:r>
           </a:p>
           <a:p>
             <a:pPr lvl="2"/>
             <a:r>
-              <a:rPr lang="en-US" dirty="0" smtClean="0"/>
+              <a:rPr lang="en-US" dirty="0"/>
               <a:t>Hint:       Do NOT use bullet lists wherever possible!</a:t>
             </a:r>
           </a:p>
@@ -12946,7 +12947,7 @@
               <a:defRPr/>
             </a:pPr>
             <a:r>
-              <a:rPr lang="de-AT" dirty="0" smtClean="0"/>
+              <a:rPr lang="de-AT" dirty="0"/>
               <a:t>Enter your name here</a:t>
             </a:r>
           </a:p>
@@ -12992,21 +12993,6 @@
   <p:clrMapOvr>
     <a:masterClrMapping/>
   </p:clrMapOvr>
-  <mc:AlternateContent xmlns:mc="http://schemas.openxmlformats.org/markup-compatibility/2006" xmlns:p14="http://schemas.microsoft.com/office/powerpoint/2010/main">
-    <mc:Choice Requires="p14">
-      <p:transition p14:dur="0"/>
-    </mc:Choice>
-    <mc:Fallback xmlns="">
-      <p:transition/>
-    </mc:Fallback>
-  </mc:AlternateContent>
-  <p:timing>
-    <p:tnLst>
-      <p:par>
-        <p:cTn id="1" dur="indefinite" restart="never" nodeType="tmRoot"/>
-      </p:par>
-    </p:tnLst>
-  </p:timing>
 </p:sldLayout>
 </file>
 
@@ -13048,7 +13034,7 @@
           <a:lstStyle/>
           <a:p>
             <a:r>
-              <a:rPr lang="en-US" dirty="0" smtClean="0"/>
+              <a:rPr lang="en-US" dirty="0"/>
               <a:t>Click to edit Master title style</a:t>
             </a:r>
             <a:endParaRPr lang="de-AT" dirty="0"/>
@@ -13080,7 +13066,7 @@
               <a:defRPr/>
             </a:pPr>
             <a:r>
-              <a:rPr lang="de-AT" dirty="0" smtClean="0"/>
+              <a:rPr lang="de-AT" dirty="0"/>
               <a:t>Enter your name here</a:t>
             </a:r>
           </a:p>
@@ -13126,21 +13112,6 @@
   <p:clrMapOvr>
     <a:masterClrMapping/>
   </p:clrMapOvr>
-  <mc:AlternateContent xmlns:mc="http://schemas.openxmlformats.org/markup-compatibility/2006" xmlns:p14="http://schemas.microsoft.com/office/powerpoint/2010/main">
-    <mc:Choice Requires="p14">
-      <p:transition p14:dur="0"/>
-    </mc:Choice>
-    <mc:Fallback xmlns="">
-      <p:transition/>
-    </mc:Fallback>
-  </mc:AlternateContent>
-  <p:timing>
-    <p:tnLst>
-      <p:par>
-        <p:cTn id="1" dur="indefinite" restart="never" nodeType="tmRoot"/>
-      </p:par>
-    </p:tnLst>
-  </p:timing>
 </p:sldLayout>
 </file>
 
@@ -13212,7 +13183,7 @@
               <a:buNone/>
               <a:tabLst/>
             </a:pPr>
-            <a:endParaRPr kumimoji="0" lang="en-GB" sz="1800" b="0" i="0" u="none" strike="noStrike" cap="none" normalizeH="0" baseline="0" smtClean="0">
+            <a:endParaRPr kumimoji="0" lang="en-GB" sz="1800" b="0" i="0" u="none" strike="noStrike" cap="none" normalizeH="0" baseline="0">
               <a:ln>
                 <a:noFill/>
               </a:ln>
@@ -13241,7 +13212,7 @@
           <a:lstStyle/>
           <a:p>
             <a:r>
-              <a:rPr lang="en-US" smtClean="0"/>
+              <a:rPr lang="en-US"/>
               <a:t>Click to edit Master title style</a:t>
             </a:r>
             <a:endParaRPr lang="en-GB"/>
@@ -17410,7 +17381,7 @@
           <a:lstStyle/>
           <a:p>
             <a:r>
-              <a:rPr lang="en-US" smtClean="0"/>
+              <a:rPr lang="en-US"/>
               <a:t>Click to edit Master title style</a:t>
             </a:r>
             <a:endParaRPr lang="de-AT"/>
@@ -17439,21 +17410,21 @@
           <a:p>
             <a:pPr lvl="0"/>
             <a:r>
-              <a:rPr lang="en-US" dirty="0" smtClean="0"/>
+              <a:rPr lang="en-US" dirty="0"/>
               <a:t>Click to edit Master text styles</a:t>
             </a:r>
           </a:p>
           <a:p>
             <a:pPr lvl="1"/>
             <a:r>
-              <a:rPr lang="en-US" dirty="0" smtClean="0"/>
+              <a:rPr lang="en-US" dirty="0"/>
               <a:t>Second level</a:t>
             </a:r>
           </a:p>
           <a:p>
             <a:pPr lvl="2"/>
             <a:r>
-              <a:rPr lang="en-US" dirty="0" smtClean="0"/>
+              <a:rPr lang="en-US" dirty="0"/>
               <a:t>Third level</a:t>
             </a:r>
           </a:p>
@@ -17481,21 +17452,21 @@
           <a:p>
             <a:pPr lvl="0"/>
             <a:r>
-              <a:rPr lang="en-US" dirty="0" smtClean="0"/>
+              <a:rPr lang="en-US" dirty="0"/>
               <a:t>Click to edit Master text styles</a:t>
             </a:r>
           </a:p>
           <a:p>
             <a:pPr lvl="1"/>
             <a:r>
-              <a:rPr lang="en-US" dirty="0" smtClean="0"/>
+              <a:rPr lang="en-US" dirty="0"/>
               <a:t>Second level</a:t>
             </a:r>
           </a:p>
           <a:p>
             <a:pPr lvl="2"/>
             <a:r>
-              <a:rPr lang="en-US" dirty="0" smtClean="0"/>
+              <a:rPr lang="en-US" dirty="0"/>
               <a:t>Third level</a:t>
             </a:r>
           </a:p>
@@ -17567,21 +17538,6 @@
   <p:clrMapOvr>
     <a:masterClrMapping/>
   </p:clrMapOvr>
-  <mc:AlternateContent xmlns:mc="http://schemas.openxmlformats.org/markup-compatibility/2006" xmlns:p14="http://schemas.microsoft.com/office/powerpoint/2010/main">
-    <mc:Choice Requires="p14">
-      <p:transition p14:dur="0"/>
-    </mc:Choice>
-    <mc:Fallback xmlns="">
-      <p:transition/>
-    </mc:Fallback>
-  </mc:AlternateContent>
-  <p:timing>
-    <p:tnLst>
-      <p:par>
-        <p:cTn id="1" dur="indefinite" restart="never" nodeType="tmRoot"/>
-      </p:par>
-    </p:tnLst>
-  </p:timing>
 </p:sldLayout>
 </file>
 
@@ -17658,7 +17614,7 @@
               <a:buNone/>
               <a:tabLst/>
             </a:pPr>
-            <a:endParaRPr kumimoji="0" lang="en-GB" sz="1800" b="0" i="0" u="none" strike="noStrike" cap="none" normalizeH="0" baseline="0" smtClean="0">
+            <a:endParaRPr kumimoji="0" lang="en-GB" sz="1800" b="0" i="0" u="none" strike="noStrike" cap="none" normalizeH="0" baseline="0">
               <a:ln>
                 <a:noFill/>
               </a:ln>
@@ -17707,7 +17663,7 @@
           <a:p>
             <a:pPr lvl="0"/>
             <a:r>
-              <a:rPr lang="de-AT" dirty="0" smtClean="0"/>
+              <a:rPr lang="de-AT" dirty="0"/>
               <a:t>Click to edit Master title style</a:t>
             </a:r>
           </a:p>
@@ -17749,21 +17705,21 @@
           <a:p>
             <a:pPr lvl="0"/>
             <a:r>
-              <a:rPr lang="de-AT" dirty="0" smtClean="0"/>
+              <a:rPr lang="de-AT" dirty="0"/>
               <a:t>Text</a:t>
             </a:r>
           </a:p>
           <a:p>
             <a:pPr lvl="1"/>
             <a:r>
-              <a:rPr lang="de-AT" dirty="0" smtClean="0"/>
+              <a:rPr lang="de-AT" dirty="0"/>
               <a:t>Text</a:t>
             </a:r>
           </a:p>
           <a:p>
             <a:pPr lvl="2"/>
             <a:r>
-              <a:rPr lang="de-AT" dirty="0" smtClean="0"/>
+              <a:rPr lang="de-AT" dirty="0"/>
               <a:t>Text</a:t>
             </a:r>
           </a:p>
@@ -17817,10 +17773,9 @@
               <a:defRPr/>
             </a:pPr>
             <a:r>
-              <a:rPr lang="de-AT" dirty="0" smtClean="0"/>
+              <a:rPr lang="de-AT" dirty="0"/>
               <a:t>Enter your name here</a:t>
             </a:r>
-            <a:endParaRPr lang="de-AT" dirty="0"/>
           </a:p>
         </p:txBody>
       </p:sp>
@@ -21979,7 +21934,7 @@
               <a:buNone/>
               <a:tabLst/>
             </a:pPr>
-            <a:endParaRPr kumimoji="0" lang="en-GB" sz="1800" b="0" i="0" u="none" strike="noStrike" cap="none" normalizeH="0" baseline="0" smtClean="0">
+            <a:endParaRPr kumimoji="0" lang="en-GB" sz="1800" b="0" i="0" u="none" strike="noStrike" cap="none" normalizeH="0" baseline="0">
               <a:ln>
                 <a:noFill/>
               </a:ln>
@@ -22043,13 +21998,6 @@
     <p:sldLayoutId id="2147483867" r:id="rId4"/>
     <p:sldLayoutId id="2147483864" r:id="rId5"/>
   </p:sldLayoutIdLst>
-  <p:timing>
-    <p:tnLst>
-      <p:par>
-        <p:cTn id="1" dur="indefinite" restart="never" nodeType="tmRoot"/>
-      </p:par>
-    </p:tnLst>
-  </p:timing>
   <p:hf hdr="0" dt="0"/>
   <p:txStyles>
     <p:titleStyle>
@@ -22521,31 +22469,23 @@
               <a:t>VU </a:t>
             </a:r>
             <a:r>
-              <a:rPr lang="en-US" sz="4400" b="0" dirty="0" err="1" smtClean="0"/>
+              <a:rPr lang="en-US" sz="4400" b="0" dirty="0" err="1"/>
               <a:t>Visualisierung</a:t>
             </a:r>
             <a:r>
-              <a:rPr lang="en-US" sz="4400" b="0" dirty="0" smtClean="0"/>
-              <a:t> 2 </a:t>
-            </a:r>
-            <a:r>
               <a:rPr lang="en-US" sz="4400" b="0" dirty="0"/>
-              <a:t>(</a:t>
-            </a:r>
-            <a:r>
-              <a:rPr lang="en-US" sz="4400" b="0" dirty="0" smtClean="0"/>
-              <a:t>186.833)</a:t>
-            </a:r>
-            <a:r>
-              <a:rPr lang="en-US" sz="4400" dirty="0"/>
-              <a:t/>
+              <a:t> 2 (186.833)</a:t>
             </a:r>
             <a:br>
               <a:rPr lang="en-US" sz="4400" dirty="0"/>
             </a:br>
             <a:r>
-              <a:rPr lang="en-GB" sz="4400" dirty="0" smtClean="0"/>
-              <a:t>&lt;Title of your Work&gt;</a:t>
+              <a:rPr lang="en-US" sz="4400" dirty="0"/>
+              <a:t>Spread of </a:t>
+            </a:r>
+            <a:r>
+              <a:rPr lang="en-GB" sz="4400" dirty="0"/>
+              <a:t>Covid-19  </a:t>
             </a:r>
             <a:endParaRPr lang="de-AT" dirty="0"/>
           </a:p>
@@ -22573,18 +22513,28 @@
           <a:p>
             <a:pPr eaLnBrk="1" hangingPunct="1"/>
             <a:r>
-              <a:rPr lang="en-US" i="1" dirty="0" smtClean="0"/>
-              <a:t>&lt;Names / </a:t>
+              <a:rPr lang="en-US" i="1" dirty="0" err="1"/>
+              <a:t>Arlind</a:t>
             </a:r>
             <a:r>
-              <a:rPr lang="en-US" i="1" dirty="0" err="1" smtClean="0"/>
-              <a:t>Matrikelnummer</a:t>
+              <a:rPr lang="en-US" i="1" dirty="0"/>
+              <a:t> </a:t>
             </a:r>
             <a:r>
-              <a:rPr lang="en-US" i="1" dirty="0" smtClean="0"/>
-              <a:t>&gt;</a:t>
+              <a:rPr lang="en-US" i="1" dirty="0" err="1"/>
+              <a:t>Avdullahi</a:t>
             </a:r>
-            <a:endParaRPr lang="en-US" i="1" dirty="0"/>
+            <a:r>
+              <a:rPr lang="en-US" i="1" dirty="0"/>
+              <a:t> 11813054</a:t>
+            </a:r>
+          </a:p>
+          <a:p>
+            <a:pPr eaLnBrk="1" hangingPunct="1"/>
+            <a:r>
+              <a:rPr lang="en-US" i="1" dirty="0"/>
+              <a:t>Princ Mullatahiri 11846033</a:t>
+            </a:r>
           </a:p>
         </p:txBody>
       </p:sp>
@@ -22675,7 +22625,7 @@
               <a:tabLst/>
             </a:pPr>
             <a:r>
-              <a:rPr kumimoji="0" lang="en-US" sz="2400" b="0" i="0" u="none" strike="noStrike" cap="none" normalizeH="0" baseline="0" dirty="0" smtClean="0">
+              <a:rPr kumimoji="0" lang="en-US" sz="2400" b="0" i="0" u="none" strike="noStrike" cap="none" normalizeH="0" baseline="0" dirty="0">
                 <a:ln>
                   <a:noFill/>
                 </a:ln>
@@ -22688,7 +22638,7 @@
               <a:t>Teaser image of your planned</a:t>
             </a:r>
             <a:r>
-              <a:rPr kumimoji="0" lang="en-US" sz="2400" b="0" i="0" u="none" strike="noStrike" cap="none" normalizeH="0" dirty="0" smtClean="0">
+              <a:rPr kumimoji="0" lang="en-US" sz="2400" b="0" i="0" u="none" strike="noStrike" cap="none" normalizeH="0" dirty="0">
                 <a:ln>
                   <a:noFill/>
                 </a:ln>
@@ -22701,7 +22651,7 @@
               <a:t> work</a:t>
             </a:r>
             <a:br>
-              <a:rPr kumimoji="0" lang="en-US" sz="2400" b="0" i="0" u="none" strike="noStrike" cap="none" normalizeH="0" dirty="0" smtClean="0">
+              <a:rPr kumimoji="0" lang="en-US" sz="2400" b="0" i="0" u="none" strike="noStrike" cap="none" normalizeH="0" dirty="0">
                 <a:ln>
                   <a:noFill/>
                 </a:ln>
@@ -22713,7 +22663,7 @@
               </a:rPr>
             </a:br>
             <a:r>
-              <a:rPr kumimoji="0" lang="en-US" sz="2400" b="0" i="0" u="none" strike="noStrike" cap="none" normalizeH="0" dirty="0" smtClean="0">
+              <a:rPr kumimoji="0" lang="en-US" sz="2400" b="0" i="0" u="none" strike="noStrike" cap="none" normalizeH="0" dirty="0">
                 <a:ln>
                   <a:noFill/>
                 </a:ln>
@@ -22725,7 +22675,7 @@
               </a:rPr>
               <a:t>(if available)</a:t>
             </a:r>
-            <a:endParaRPr kumimoji="0" lang="en-US" sz="2400" b="0" i="0" u="none" strike="noStrike" cap="none" normalizeH="0" baseline="0" dirty="0" smtClean="0">
+            <a:endParaRPr kumimoji="0" lang="en-US" sz="2400" b="0" i="0" u="none" strike="noStrike" cap="none" normalizeH="0" baseline="0" dirty="0">
               <a:ln>
                 <a:noFill/>
               </a:ln>
@@ -22748,21 +22698,6 @@
   <p:clrMapOvr>
     <a:masterClrMapping/>
   </p:clrMapOvr>
-  <mc:AlternateContent xmlns:mc="http://schemas.openxmlformats.org/markup-compatibility/2006" xmlns:p14="http://schemas.microsoft.com/office/powerpoint/2010/main">
-    <mc:Choice Requires="p14">
-      <p:transition p14:dur="0"/>
-    </mc:Choice>
-    <mc:Fallback xmlns="">
-      <p:transition/>
-    </mc:Fallback>
-  </mc:AlternateContent>
-  <p:timing>
-    <p:tnLst>
-      <p:par>
-        <p:cTn id="1" dur="indefinite" restart="never" nodeType="tmRoot"/>
-      </p:par>
-    </p:tnLst>
-  </p:timing>
 </p:sld>
 </file>
 
@@ -22799,10 +22734,9 @@
           <a:lstStyle/>
           <a:p>
             <a:r>
-              <a:rPr lang="en-US" dirty="0" smtClean="0"/>
+              <a:rPr lang="en-US" dirty="0"/>
               <a:t>Short Data Summary</a:t>
             </a:r>
-            <a:endParaRPr lang="en-US" dirty="0"/>
           </a:p>
         </p:txBody>
       </p:sp>
@@ -22821,6 +22755,115 @@
           <a:bodyPr/>
           <a:lstStyle/>
           <a:p>
+            <a:r>
+              <a:rPr lang="en-US" dirty="0"/>
+              <a:t>Our dataset consists of data of Covid19 spread across world.</a:t>
+            </a:r>
+          </a:p>
+          <a:p>
+            <a:r>
+              <a:rPr lang="en-US" dirty="0"/>
+              <a:t>Source: Kaggle</a:t>
+            </a:r>
+          </a:p>
+          <a:p>
+            <a:r>
+              <a:rPr lang="en-US" dirty="0"/>
+              <a:t>It contains number of cases per country from 22</a:t>
+            </a:r>
+            <a:r>
+              <a:rPr lang="en-US" baseline="30000" dirty="0"/>
+              <a:t>th</a:t>
+            </a:r>
+            <a:r>
+              <a:rPr lang="en-US" dirty="0"/>
+              <a:t> of January until 16</a:t>
+            </a:r>
+            <a:r>
+              <a:rPr lang="en-US" baseline="30000" dirty="0"/>
+              <a:t>th</a:t>
+            </a:r>
+            <a:r>
+              <a:rPr lang="en-US" dirty="0"/>
+              <a:t> of April.</a:t>
+            </a:r>
+          </a:p>
+          <a:p>
+            <a:pPr lvl="1"/>
+            <a:r>
+              <a:rPr lang="en-US" dirty="0"/>
+              <a:t>First case in Europe 24</a:t>
+            </a:r>
+            <a:r>
+              <a:rPr lang="en-US" baseline="30000" dirty="0"/>
+              <a:t>th</a:t>
+            </a:r>
+            <a:r>
+              <a:rPr lang="en-US" dirty="0"/>
+              <a:t> </a:t>
+            </a:r>
+            <a:r>
+              <a:rPr lang="en-US"/>
+              <a:t>of January</a:t>
+            </a:r>
+            <a:endParaRPr lang="en-US" dirty="0"/>
+          </a:p>
+          <a:p>
+            <a:pPr lvl="1"/>
+            <a:r>
+              <a:rPr lang="en-US" dirty="0"/>
+              <a:t>As of 17</a:t>
+            </a:r>
+            <a:r>
+              <a:rPr lang="en-US" baseline="30000" dirty="0"/>
+              <a:t>th</a:t>
+            </a:r>
+            <a:r>
+              <a:rPr lang="en-US" dirty="0"/>
+              <a:t> of March all countries in Europe have confirmed cases</a:t>
+            </a:r>
+          </a:p>
+          <a:p>
+            <a:pPr lvl="1"/>
+            <a:r>
+              <a:rPr lang="en-US" dirty="0"/>
+              <a:t>Until 16</a:t>
+            </a:r>
+            <a:r>
+              <a:rPr lang="en-US" baseline="30000" dirty="0"/>
+              <a:t>th</a:t>
+            </a:r>
+            <a:r>
+              <a:rPr lang="en-US" dirty="0"/>
+              <a:t> of April there are 965488 confirmed cases in Europe</a:t>
+            </a:r>
+          </a:p>
+          <a:p>
+            <a:r>
+              <a:rPr lang="en-US" dirty="0"/>
+              <a:t>Questions we plan to answer:</a:t>
+            </a:r>
+          </a:p>
+          <a:p>
+            <a:pPr lvl="1"/>
+            <a:r>
+              <a:rPr lang="en-US" dirty="0"/>
+              <a:t>Spread patterns of Covid-19</a:t>
+            </a:r>
+          </a:p>
+          <a:p>
+            <a:pPr lvl="1"/>
+            <a:r>
+              <a:rPr lang="en-US" dirty="0"/>
+              <a:t>How Covid-19 spread trajectory looks like</a:t>
+            </a:r>
+          </a:p>
+          <a:p>
+            <a:pPr lvl="1"/>
+            <a:endParaRPr lang="en-US" dirty="0"/>
+          </a:p>
+          <a:p>
+            <a:pPr lvl="1"/>
             <a:endParaRPr lang="en-US" dirty="0"/>
           </a:p>
         </p:txBody>
@@ -22844,8 +22887,8 @@
               <a:defRPr/>
             </a:pPr>
             <a:r>
-              <a:rPr lang="de-AT" smtClean="0"/>
-              <a:t>Enter your name here</a:t>
+              <a:rPr lang="de-AT" dirty="0"/>
+              <a:t>Arlind Avdullahi, Princ Mullatahiri</a:t>
             </a:r>
           </a:p>
           <a:p>
@@ -22885,6 +22928,100 @@
           </a:p>
         </p:txBody>
       </p:sp>
+      <p:sp>
+        <p:nvSpPr>
+          <p:cNvPr id="6" name="Rectangle 1">
+            <a:extLst>
+              <a:ext uri="{FF2B5EF4-FFF2-40B4-BE49-F238E27FC236}">
+                <a16:creationId xmlns:a16="http://schemas.microsoft.com/office/drawing/2014/main" id="{5EAC8581-9EA1-4F5B-81A1-487F28F730F3}"/>
+              </a:ext>
+            </a:extLst>
+          </p:cNvPr>
+          <p:cNvSpPr>
+            <a:spLocks noChangeArrowheads="1"/>
+          </p:cNvSpPr>
+          <p:nvPr/>
+        </p:nvSpPr>
+        <p:spPr bwMode="auto">
+          <a:xfrm>
+            <a:off x="0" y="43934"/>
+            <a:ext cx="184731" cy="369332"/>
+          </a:xfrm>
+          <a:prstGeom prst="rect">
+            <a:avLst/>
+          </a:prstGeom>
+          <a:noFill/>
+          <a:ln>
+            <a:noFill/>
+          </a:ln>
+          <a:effectLst/>
+          <a:extLst>
+            <a:ext uri="{909E8E84-426E-40DD-AFC4-6F175D3DCCD1}">
+              <a14:hiddenFill xmlns:a14="http://schemas.microsoft.com/office/drawing/2010/main">
+                <a:solidFill>
+                  <a:schemeClr val="accent1"/>
+                </a:solidFill>
+              </a14:hiddenFill>
+            </a:ext>
+            <a:ext uri="{91240B29-F687-4F45-9708-019B960494DF}">
+              <a14:hiddenLine xmlns:a14="http://schemas.microsoft.com/office/drawing/2010/main" w="9525">
+                <a:solidFill>
+                  <a:schemeClr val="tx1"/>
+                </a:solidFill>
+                <a:miter lim="800000"/>
+                <a:headEnd/>
+                <a:tailEnd/>
+              </a14:hiddenLine>
+            </a:ext>
+            <a:ext uri="{AF507438-7753-43E0-B8FC-AC1667EBCBE1}">
+              <a14:hiddenEffects xmlns:a14="http://schemas.microsoft.com/office/drawing/2010/main">
+                <a:effectLst>
+                  <a:outerShdw dist="35921" dir="2700000" algn="ctr" rotWithShape="0">
+                    <a:schemeClr val="bg2"/>
+                  </a:outerShdw>
+                </a:effectLst>
+              </a14:hiddenEffects>
+            </a:ext>
+          </a:extLst>
+        </p:spPr>
+        <p:txBody>
+          <a:bodyPr vert="horz" wrap="none" lIns="91440" tIns="45720" rIns="91440" bIns="45720" numCol="1" anchor="ctr" anchorCtr="0" compatLnSpc="1">
+            <a:prstTxWarp prst="textNoShape">
+              <a:avLst/>
+            </a:prstTxWarp>
+            <a:spAutoFit/>
+          </a:bodyPr>
+          <a:lstStyle/>
+          <a:p>
+            <a:pPr marL="0" marR="0" lvl="0" indent="0" algn="l" defTabSz="914400" rtl="0" eaLnBrk="0" fontAlgn="base" latinLnBrk="0" hangingPunct="0">
+              <a:lnSpc>
+                <a:spcPct val="100000"/>
+              </a:lnSpc>
+              <a:spcBef>
+                <a:spcPct val="0"/>
+              </a:spcBef>
+              <a:spcAft>
+                <a:spcPct val="0"/>
+              </a:spcAft>
+              <a:buClrTx/>
+              <a:buSzTx/>
+              <a:buFontTx/>
+              <a:buNone/>
+              <a:tabLst/>
+            </a:pPr>
+            <a:endParaRPr kumimoji="0" lang="en-US" altLang="en-US" sz="1800" b="0" i="0" u="none" strike="noStrike" cap="none" normalizeH="0" baseline="0" dirty="0">
+              <a:ln>
+                <a:noFill/>
+              </a:ln>
+              <a:solidFill>
+                <a:schemeClr val="tx1"/>
+              </a:solidFill>
+              <a:effectLst/>
+              <a:latin typeface="Arial" panose="020B0604020202020204" pitchFamily="34" charset="0"/>
+            </a:endParaRPr>
+          </a:p>
+        </p:txBody>
+      </p:sp>
     </p:spTree>
     <p:extLst>
       <p:ext uri="{BB962C8B-B14F-4D97-AF65-F5344CB8AC3E}">
@@ -22895,14 +23032,6 @@
   <p:clrMapOvr>
     <a:masterClrMapping/>
   </p:clrMapOvr>
-  <mc:AlternateContent xmlns:mc="http://schemas.openxmlformats.org/markup-compatibility/2006" xmlns:p14="http://schemas.microsoft.com/office/powerpoint/2010/main">
-    <mc:Choice Requires="p14">
-      <p:transition p14:dur="0"/>
-    </mc:Choice>
-    <mc:Fallback xmlns="">
-      <p:transition/>
-    </mc:Fallback>
-  </mc:AlternateContent>
 </p:sld>
 </file>
 
@@ -22939,32 +23068,443 @@
           <a:lstStyle/>
           <a:p>
             <a:r>
-              <a:rPr lang="en-US" dirty="0" smtClean="0"/>
+              <a:rPr lang="en-US" dirty="0"/>
               <a:t>Technique Summary</a:t>
             </a:r>
-            <a:endParaRPr lang="en-US" dirty="0"/>
           </a:p>
         </p:txBody>
       </p:sp>
-      <p:sp>
-        <p:nvSpPr>
-          <p:cNvPr id="3" name="Content Placeholder 2"/>
-          <p:cNvSpPr>
-            <a:spLocks noGrp="1"/>
-          </p:cNvSpPr>
-          <p:nvPr>
-            <p:ph idx="1"/>
-          </p:nvPr>
-        </p:nvSpPr>
-        <p:spPr/>
-        <p:txBody>
-          <a:bodyPr/>
-          <a:lstStyle/>
-          <a:p>
-            <a:endParaRPr lang="en-US"/>
-          </a:p>
-        </p:txBody>
-      </p:sp>
+      <mc:AlternateContent xmlns:mc="http://schemas.openxmlformats.org/markup-compatibility/2006">
+        <mc:Choice xmlns:a14="http://schemas.microsoft.com/office/drawing/2010/main" Requires="a14">
+          <p:sp>
+            <p:nvSpPr>
+              <p:cNvPr id="3" name="Content Placeholder 2"/>
+              <p:cNvSpPr>
+                <a:spLocks noGrp="1"/>
+              </p:cNvSpPr>
+              <p:nvPr>
+                <p:ph idx="1"/>
+              </p:nvPr>
+            </p:nvSpPr>
+            <p:spPr>
+              <a:xfrm>
+                <a:off x="154563" y="914886"/>
+                <a:ext cx="11849688" cy="3328137"/>
+              </a:xfrm>
+            </p:spPr>
+            <p:txBody>
+              <a:bodyPr/>
+              <a:lstStyle/>
+              <a:p>
+                <a:r>
+                  <a:rPr lang="en-US" dirty="0"/>
+                  <a:t>Their technique approximates the underlying data distribution over time through the application of a 2D kernel density estimation.</a:t>
+                </a:r>
+              </a:p>
+              <a:p>
+                <a:pPr lvl="1"/>
+                <a14:m>
+                  <m:oMath xmlns:m="http://schemas.openxmlformats.org/officeDocument/2006/math">
+                    <m:sSub>
+                      <m:sSubPr>
+                        <m:ctrlPr>
+                          <a:rPr lang="en-US" sz="1800" b="0" i="1" smtClean="0">
+                            <a:latin typeface="Cambria Math" panose="02040503050406030204" pitchFamily="18" charset="0"/>
+                          </a:rPr>
+                        </m:ctrlPr>
+                      </m:sSubPr>
+                      <m:e>
+                        <m:r>
+                          <a:rPr lang="en-US" sz="1800" b="0" i="1" smtClean="0">
+                            <a:latin typeface="Cambria Math" panose="02040503050406030204" pitchFamily="18" charset="0"/>
+                          </a:rPr>
+                          <m:t>𝑓</m:t>
+                        </m:r>
+                      </m:e>
+                      <m:sub>
+                        <m:r>
+                          <a:rPr lang="en-US" sz="1800" b="0" i="1" smtClean="0">
+                            <a:latin typeface="Cambria Math" panose="02040503050406030204" pitchFamily="18" charset="0"/>
+                          </a:rPr>
+                          <m:t>2</m:t>
+                        </m:r>
+                        <m:r>
+                          <a:rPr lang="en-US" sz="1800" b="0" i="1" smtClean="0">
+                            <a:latin typeface="Cambria Math" panose="02040503050406030204" pitchFamily="18" charset="0"/>
+                          </a:rPr>
+                          <m:t>𝐷</m:t>
+                        </m:r>
+                      </m:sub>
+                    </m:sSub>
+                    <m:d>
+                      <m:dPr>
+                        <m:ctrlPr>
+                          <a:rPr lang="en-US" sz="1800" b="0" i="1" smtClean="0">
+                            <a:latin typeface="Cambria Math" panose="02040503050406030204" pitchFamily="18" charset="0"/>
+                          </a:rPr>
+                        </m:ctrlPr>
+                      </m:dPr>
+                      <m:e>
+                        <m:r>
+                          <a:rPr lang="en-US" sz="1800" b="0" i="1" smtClean="0">
+                            <a:latin typeface="Cambria Math" panose="02040503050406030204" pitchFamily="18" charset="0"/>
+                          </a:rPr>
+                          <m:t>𝑥</m:t>
+                        </m:r>
+                        <m:r>
+                          <a:rPr lang="en-US" sz="1800" b="0" i="1" smtClean="0">
+                            <a:latin typeface="Cambria Math" panose="02040503050406030204" pitchFamily="18" charset="0"/>
+                          </a:rPr>
+                          <m:t>,</m:t>
+                        </m:r>
+                        <m:r>
+                          <a:rPr lang="en-US" sz="1800" b="0" i="1" smtClean="0">
+                            <a:latin typeface="Cambria Math" panose="02040503050406030204" pitchFamily="18" charset="0"/>
+                          </a:rPr>
+                          <m:t>𝑦</m:t>
+                        </m:r>
+                      </m:e>
+                    </m:d>
+                    <m:r>
+                      <a:rPr lang="en-US" sz="1800" b="0" i="1" smtClean="0">
+                        <a:latin typeface="Cambria Math" panose="02040503050406030204" pitchFamily="18" charset="0"/>
+                      </a:rPr>
+                      <m:t>= </m:t>
+                    </m:r>
+                    <m:f>
+                      <m:fPr>
+                        <m:ctrlPr>
+                          <a:rPr lang="en-US" sz="1800" i="1" smtClean="0">
+                            <a:latin typeface="Cambria Math" panose="02040503050406030204" pitchFamily="18" charset="0"/>
+                          </a:rPr>
+                        </m:ctrlPr>
+                      </m:fPr>
+                      <m:num>
+                        <m:r>
+                          <a:rPr lang="en-US" sz="1800" b="0" i="1" smtClean="0">
+                            <a:latin typeface="Cambria Math" panose="02040503050406030204" pitchFamily="18" charset="0"/>
+                          </a:rPr>
+                          <m:t>1</m:t>
+                        </m:r>
+                      </m:num>
+                      <m:den>
+                        <m:r>
+                          <a:rPr lang="en-US" sz="1800" b="0" i="1" smtClean="0">
+                            <a:latin typeface="Cambria Math" panose="02040503050406030204" pitchFamily="18" charset="0"/>
+                          </a:rPr>
+                          <m:t>𝑁</m:t>
+                        </m:r>
+                      </m:den>
+                    </m:f>
+                    <m:nary>
+                      <m:naryPr>
+                        <m:chr m:val="∑"/>
+                        <m:ctrlPr>
+                          <a:rPr lang="en-US" sz="1800" i="1" smtClean="0">
+                            <a:latin typeface="Cambria Math" panose="02040503050406030204" pitchFamily="18" charset="0"/>
+                          </a:rPr>
+                        </m:ctrlPr>
+                      </m:naryPr>
+                      <m:sub>
+                        <m:r>
+                          <m:rPr>
+                            <m:brk m:alnAt="23"/>
+                          </m:rPr>
+                          <a:rPr lang="en-US" sz="1800" b="0" i="1" smtClean="0">
+                            <a:latin typeface="Cambria Math" panose="02040503050406030204" pitchFamily="18" charset="0"/>
+                          </a:rPr>
+                          <m:t>𝑖</m:t>
+                        </m:r>
+                        <m:r>
+                          <a:rPr lang="en-US" sz="1800" b="0" i="1" smtClean="0">
+                            <a:latin typeface="Cambria Math" panose="02040503050406030204" pitchFamily="18" charset="0"/>
+                          </a:rPr>
+                          <m:t>=1</m:t>
+                        </m:r>
+                      </m:sub>
+                      <m:sup>
+                        <m:r>
+                          <a:rPr lang="en-US" sz="1800" b="0" i="1" smtClean="0">
+                            <a:latin typeface="Cambria Math" panose="02040503050406030204" pitchFamily="18" charset="0"/>
+                          </a:rPr>
+                          <m:t>𝑁</m:t>
+                        </m:r>
+                      </m:sup>
+                      <m:e>
+                        <m:f>
+                          <m:fPr>
+                            <m:ctrlPr>
+                              <a:rPr lang="en-US" sz="1800" i="1" smtClean="0">
+                                <a:latin typeface="Cambria Math" panose="02040503050406030204" pitchFamily="18" charset="0"/>
+                              </a:rPr>
+                            </m:ctrlPr>
+                          </m:fPr>
+                          <m:num>
+                            <m:r>
+                              <a:rPr lang="en-US" sz="1800" b="0" i="1" smtClean="0">
+                                <a:latin typeface="Cambria Math" panose="02040503050406030204" pitchFamily="18" charset="0"/>
+                              </a:rPr>
+                              <m:t>1</m:t>
+                            </m:r>
+                          </m:num>
+                          <m:den>
+                            <m:sSup>
+                              <m:sSupPr>
+                                <m:ctrlPr>
+                                  <a:rPr lang="en-US" sz="1800" b="0" i="1" smtClean="0">
+                                    <a:latin typeface="Cambria Math" panose="02040503050406030204" pitchFamily="18" charset="0"/>
+                                  </a:rPr>
+                                </m:ctrlPr>
+                              </m:sSupPr>
+                              <m:e>
+                                <m:r>
+                                  <a:rPr lang="en-US" sz="1800" b="0" i="1" smtClean="0">
+                                    <a:latin typeface="Cambria Math" panose="02040503050406030204" pitchFamily="18" charset="0"/>
+                                  </a:rPr>
+                                  <m:t>h</m:t>
+                                </m:r>
+                              </m:e>
+                              <m:sup>
+                                <m:r>
+                                  <a:rPr lang="en-US" sz="1800" b="0" i="1" smtClean="0">
+                                    <a:latin typeface="Cambria Math" panose="02040503050406030204" pitchFamily="18" charset="0"/>
+                                  </a:rPr>
+                                  <m:t>2</m:t>
+                                </m:r>
+                              </m:sup>
+                            </m:sSup>
+                          </m:den>
+                        </m:f>
+                        <m:r>
+                          <a:rPr lang="en-US" sz="1800" b="0" i="1" smtClean="0">
+                            <a:latin typeface="Cambria Math" panose="02040503050406030204" pitchFamily="18" charset="0"/>
+                          </a:rPr>
+                          <m:t>𝐾</m:t>
+                        </m:r>
+                        <m:r>
+                          <a:rPr lang="en-US" sz="1800" b="0" i="1" smtClean="0">
+                            <a:latin typeface="Cambria Math" panose="02040503050406030204" pitchFamily="18" charset="0"/>
+                          </a:rPr>
+                          <m:t>(</m:t>
+                        </m:r>
+                        <m:f>
+                          <m:fPr>
+                            <m:ctrlPr>
+                              <a:rPr lang="en-US" sz="1800" b="0" i="1" smtClean="0">
+                                <a:latin typeface="Cambria Math" panose="02040503050406030204" pitchFamily="18" charset="0"/>
+                              </a:rPr>
+                            </m:ctrlPr>
+                          </m:fPr>
+                          <m:num>
+                            <m:r>
+                              <a:rPr lang="en-US" sz="1800" b="0" i="1" smtClean="0">
+                                <a:latin typeface="Cambria Math" panose="02040503050406030204" pitchFamily="18" charset="0"/>
+                              </a:rPr>
+                              <m:t>𝑥</m:t>
+                            </m:r>
+                            <m:r>
+                              <a:rPr lang="en-US" sz="1800" b="0" i="1" smtClean="0">
+                                <a:latin typeface="Cambria Math" panose="02040503050406030204" pitchFamily="18" charset="0"/>
+                              </a:rPr>
+                              <m:t>−</m:t>
+                            </m:r>
+                            <m:sSub>
+                              <m:sSubPr>
+                                <m:ctrlPr>
+                                  <a:rPr lang="en-US" sz="1800" b="0" i="1" smtClean="0">
+                                    <a:latin typeface="Cambria Math" panose="02040503050406030204" pitchFamily="18" charset="0"/>
+                                  </a:rPr>
+                                </m:ctrlPr>
+                              </m:sSubPr>
+                              <m:e>
+                                <m:r>
+                                  <a:rPr lang="en-US" sz="1800" b="0" i="1" smtClean="0">
+                                    <a:latin typeface="Cambria Math" panose="02040503050406030204" pitchFamily="18" charset="0"/>
+                                  </a:rPr>
+                                  <m:t>𝑥</m:t>
+                                </m:r>
+                              </m:e>
+                              <m:sub>
+                                <m:r>
+                                  <a:rPr lang="en-US" sz="1800" b="0" i="1" smtClean="0">
+                                    <a:latin typeface="Cambria Math" panose="02040503050406030204" pitchFamily="18" charset="0"/>
+                                  </a:rPr>
+                                  <m:t>𝑖</m:t>
+                                </m:r>
+                              </m:sub>
+                            </m:sSub>
+                          </m:num>
+                          <m:den>
+                            <m:r>
+                              <a:rPr lang="en-US" sz="1800" b="0" i="1" smtClean="0">
+                                <a:latin typeface="Cambria Math" panose="02040503050406030204" pitchFamily="18" charset="0"/>
+                              </a:rPr>
+                              <m:t>h</m:t>
+                            </m:r>
+                          </m:den>
+                        </m:f>
+                        <m:r>
+                          <a:rPr lang="en-US" sz="1800" b="0" i="1" smtClean="0">
+                            <a:latin typeface="Cambria Math" panose="02040503050406030204" pitchFamily="18" charset="0"/>
+                          </a:rPr>
+                          <m:t>,</m:t>
+                        </m:r>
+                        <m:f>
+                          <m:fPr>
+                            <m:ctrlPr>
+                              <a:rPr lang="en-US" sz="1800" b="0" i="1" smtClean="0">
+                                <a:latin typeface="Cambria Math" panose="02040503050406030204" pitchFamily="18" charset="0"/>
+                              </a:rPr>
+                            </m:ctrlPr>
+                          </m:fPr>
+                          <m:num>
+                            <m:r>
+                              <a:rPr lang="en-US" sz="1800" b="0" i="1" smtClean="0">
+                                <a:latin typeface="Cambria Math" panose="02040503050406030204" pitchFamily="18" charset="0"/>
+                              </a:rPr>
+                              <m:t>𝑦</m:t>
+                            </m:r>
+                            <m:r>
+                              <a:rPr lang="en-US" sz="1800" b="0" i="1" smtClean="0">
+                                <a:latin typeface="Cambria Math" panose="02040503050406030204" pitchFamily="18" charset="0"/>
+                              </a:rPr>
+                              <m:t>−</m:t>
+                            </m:r>
+                            <m:sSub>
+                              <m:sSubPr>
+                                <m:ctrlPr>
+                                  <a:rPr lang="en-US" sz="1800" b="0" i="1" smtClean="0">
+                                    <a:latin typeface="Cambria Math" panose="02040503050406030204" pitchFamily="18" charset="0"/>
+                                  </a:rPr>
+                                </m:ctrlPr>
+                              </m:sSubPr>
+                              <m:e>
+                                <m:r>
+                                  <a:rPr lang="en-US" sz="1800" b="0" i="1" smtClean="0">
+                                    <a:latin typeface="Cambria Math" panose="02040503050406030204" pitchFamily="18" charset="0"/>
+                                  </a:rPr>
+                                  <m:t>𝑦</m:t>
+                                </m:r>
+                              </m:e>
+                              <m:sub>
+                                <m:r>
+                                  <a:rPr lang="en-US" sz="1800" b="0" i="1" smtClean="0">
+                                    <a:latin typeface="Cambria Math" panose="02040503050406030204" pitchFamily="18" charset="0"/>
+                                  </a:rPr>
+                                  <m:t>𝑖</m:t>
+                                </m:r>
+                              </m:sub>
+                            </m:sSub>
+                          </m:num>
+                          <m:den>
+                            <m:r>
+                              <a:rPr lang="en-US" sz="1800" b="0" i="1" smtClean="0">
+                                <a:latin typeface="Cambria Math" panose="02040503050406030204" pitchFamily="18" charset="0"/>
+                              </a:rPr>
+                              <m:t>h</m:t>
+                            </m:r>
+                          </m:den>
+                        </m:f>
+                        <m:r>
+                          <a:rPr lang="en-US" sz="1800" b="0" i="1" smtClean="0">
+                            <a:latin typeface="Cambria Math" panose="02040503050406030204" pitchFamily="18" charset="0"/>
+                          </a:rPr>
+                          <m:t>)</m:t>
+                        </m:r>
+                      </m:e>
+                    </m:nary>
+                  </m:oMath>
+                </a14:m>
+                <a:r>
+                  <a:rPr lang="en-US" sz="1800" dirty="0"/>
+                  <a:t>, </a:t>
+                </a:r>
+              </a:p>
+              <a:p>
+                <a:pPr lvl="2"/>
+                <a:r>
+                  <a:rPr lang="en-US" sz="1800" dirty="0"/>
+                  <a:t>N – number of samples, h- bandwidth of kernel, (</a:t>
+                </a:r>
+                <a:r>
+                  <a:rPr lang="en-US" sz="1800" dirty="0" err="1"/>
+                  <a:t>x,y</a:t>
+                </a:r>
+                <a:r>
+                  <a:rPr lang="en-US" sz="1800" dirty="0"/>
+                  <a:t>) – location longitude and latitude.</a:t>
+                </a:r>
+              </a:p>
+              <a:p>
+                <a:pPr lvl="1"/>
+                <a:r>
+                  <a:rPr lang="en-US" dirty="0"/>
+                  <a:t>Gravity model to extract flow maps of non-directional statistical data</a:t>
+                </a:r>
+              </a:p>
+              <a:p>
+                <a:pPr lvl="1"/>
+                <a:r>
+                  <a:rPr lang="en-US" dirty="0"/>
+                  <a:t>For visualization they apply line integral convolution with animated directional glyphs on the map and oriented line integral convolution.</a:t>
+                </a:r>
+              </a:p>
+              <a:p>
+                <a:pPr lvl="1"/>
+                <a:endParaRPr lang="en-US" dirty="0"/>
+              </a:p>
+              <a:p>
+                <a:pPr lvl="3"/>
+                <a:r>
+                  <a:rPr lang="en-US" dirty="0"/>
+                  <a:t>								</a:t>
+                </a:r>
+              </a:p>
+              <a:p>
+                <a:pPr lvl="2"/>
+                <a:endParaRPr lang="en-US" dirty="0"/>
+              </a:p>
+            </p:txBody>
+          </p:sp>
+        </mc:Choice>
+        <mc:Fallback>
+          <p:sp>
+            <p:nvSpPr>
+              <p:cNvPr id="3" name="Content Placeholder 2"/>
+              <p:cNvSpPr>
+                <a:spLocks noGrp="1" noRot="1" noChangeAspect="1" noMove="1" noResize="1" noEditPoints="1" noAdjustHandles="1" noChangeArrowheads="1" noChangeShapeType="1" noTextEdit="1"/>
+              </p:cNvSpPr>
+              <p:nvPr>
+                <p:ph idx="1"/>
+              </p:nvPr>
+            </p:nvSpPr>
+            <p:spPr>
+              <a:xfrm>
+                <a:off x="154563" y="914886"/>
+                <a:ext cx="11849688" cy="3328137"/>
+              </a:xfrm>
+              <a:blipFill>
+                <a:blip r:embed="rId3"/>
+                <a:stretch>
+                  <a:fillRect t="-1832" r="-1029" b="-8974"/>
+                </a:stretch>
+              </a:blipFill>
+            </p:spPr>
+            <p:txBody>
+              <a:bodyPr/>
+              <a:lstStyle/>
+              <a:p>
+                <a:r>
+                  <a:rPr lang="en-US">
+                    <a:noFill/>
+                  </a:rPr>
+                  <a:t> </a:t>
+                </a:r>
+              </a:p>
+            </p:txBody>
+          </p:sp>
+        </mc:Fallback>
+      </mc:AlternateContent>
       <p:sp>
         <p:nvSpPr>
           <p:cNvPr id="4" name="Footer Placeholder 3"/>
@@ -22984,8 +23524,8 @@
               <a:defRPr/>
             </a:pPr>
             <a:r>
-              <a:rPr lang="de-AT" smtClean="0"/>
-              <a:t>Enter your name here</a:t>
+              <a:rPr lang="de-AT" dirty="0"/>
+              <a:t>Arlind Avdullahi, Princ Mullatahiri</a:t>
             </a:r>
           </a:p>
           <a:p>
@@ -23025,6 +23565,169 @@
           </a:p>
         </p:txBody>
       </p:sp>
+      <p:pic>
+        <p:nvPicPr>
+          <p:cNvPr id="9" name="Picture 8">
+            <a:extLst>
+              <a:ext uri="{FF2B5EF4-FFF2-40B4-BE49-F238E27FC236}">
+                <a16:creationId xmlns:a16="http://schemas.microsoft.com/office/drawing/2014/main" id="{0FB3F62A-3DBC-48B5-B891-35A678103285}"/>
+              </a:ext>
+            </a:extLst>
+          </p:cNvPr>
+          <p:cNvPicPr>
+            <a:picLocks noChangeAspect="1"/>
+          </p:cNvPicPr>
+          <p:nvPr/>
+        </p:nvPicPr>
+        <p:blipFill>
+          <a:blip r:embed="rId4"/>
+          <a:stretch>
+            <a:fillRect/>
+          </a:stretch>
+        </p:blipFill>
+        <p:spPr>
+          <a:xfrm>
+            <a:off x="3328224" y="4243023"/>
+            <a:ext cx="2381250" cy="2233613"/>
+          </a:xfrm>
+          <a:prstGeom prst="rect">
+            <a:avLst/>
+          </a:prstGeom>
+        </p:spPr>
+      </p:pic>
+      <p:pic>
+        <p:nvPicPr>
+          <p:cNvPr id="10" name="Picture 9">
+            <a:extLst>
+              <a:ext uri="{FF2B5EF4-FFF2-40B4-BE49-F238E27FC236}">
+                <a16:creationId xmlns:a16="http://schemas.microsoft.com/office/drawing/2014/main" id="{109DA5C4-4787-47C1-891E-21EF52B6851A}"/>
+              </a:ext>
+            </a:extLst>
+          </p:cNvPr>
+          <p:cNvPicPr>
+            <a:picLocks noChangeAspect="1"/>
+          </p:cNvPicPr>
+          <p:nvPr/>
+        </p:nvPicPr>
+        <p:blipFill>
+          <a:blip r:embed="rId5"/>
+          <a:stretch>
+            <a:fillRect/>
+          </a:stretch>
+        </p:blipFill>
+        <p:spPr>
+          <a:xfrm>
+            <a:off x="824170" y="4253751"/>
+            <a:ext cx="2376487" cy="2195512"/>
+          </a:xfrm>
+          <a:prstGeom prst="rect">
+            <a:avLst/>
+          </a:prstGeom>
+        </p:spPr>
+      </p:pic>
+      <p:pic>
+        <p:nvPicPr>
+          <p:cNvPr id="11" name="Picture 10">
+            <a:extLst>
+              <a:ext uri="{FF2B5EF4-FFF2-40B4-BE49-F238E27FC236}">
+                <a16:creationId xmlns:a16="http://schemas.microsoft.com/office/drawing/2014/main" id="{2541A101-ACC2-4325-8C5B-2A7F2EE3791D}"/>
+              </a:ext>
+            </a:extLst>
+          </p:cNvPr>
+          <p:cNvPicPr>
+            <a:picLocks noChangeAspect="1"/>
+          </p:cNvPicPr>
+          <p:nvPr/>
+        </p:nvPicPr>
+        <p:blipFill>
+          <a:blip r:embed="rId6"/>
+          <a:stretch>
+            <a:fillRect/>
+          </a:stretch>
+        </p:blipFill>
+        <p:spPr>
+          <a:xfrm>
+            <a:off x="5837162" y="4243023"/>
+            <a:ext cx="2381251" cy="2206090"/>
+          </a:xfrm>
+          <a:prstGeom prst="rect">
+            <a:avLst/>
+          </a:prstGeom>
+        </p:spPr>
+      </p:pic>
+      <p:sp>
+        <p:nvSpPr>
+          <p:cNvPr id="14" name="TextBox 13">
+            <a:extLst>
+              <a:ext uri="{FF2B5EF4-FFF2-40B4-BE49-F238E27FC236}">
+                <a16:creationId xmlns:a16="http://schemas.microsoft.com/office/drawing/2014/main" id="{6F90AE06-3FAB-489B-88CF-374200747DC2}"/>
+              </a:ext>
+            </a:extLst>
+          </p:cNvPr>
+          <p:cNvSpPr txBox="1"/>
+          <p:nvPr/>
+        </p:nvSpPr>
+        <p:spPr>
+          <a:xfrm>
+            <a:off x="8346101" y="4358413"/>
+            <a:ext cx="3368110" cy="1569660"/>
+          </a:xfrm>
+          <a:prstGeom prst="rect">
+            <a:avLst/>
+          </a:prstGeom>
+          <a:noFill/>
+        </p:spPr>
+        <p:txBody>
+          <a:bodyPr wrap="square" rtlCol="0">
+            <a:spAutoFit/>
+          </a:bodyPr>
+          <a:lstStyle/>
+          <a:p>
+            <a:r>
+              <a:rPr lang="en-US" sz="2400" dirty="0">
+                <a:latin typeface="Calibri" panose="020F0502020204030204" pitchFamily="34" charset="0"/>
+              </a:rPr>
+              <a:t>Fig.1 a.) 2D KDE for Europe in 1</a:t>
+            </a:r>
+            <a:r>
+              <a:rPr lang="en-US" sz="2400" baseline="30000" dirty="0">
+                <a:latin typeface="Calibri" panose="020F0502020204030204" pitchFamily="34" charset="0"/>
+              </a:rPr>
+              <a:t>st</a:t>
+            </a:r>
+            <a:r>
+              <a:rPr lang="en-US" sz="2400" dirty="0">
+                <a:latin typeface="Calibri" panose="020F0502020204030204" pitchFamily="34" charset="0"/>
+              </a:rPr>
+              <a:t> of March, b.) for 20</a:t>
+            </a:r>
+            <a:r>
+              <a:rPr lang="en-US" sz="2400" baseline="30000" dirty="0">
+                <a:latin typeface="Calibri" panose="020F0502020204030204" pitchFamily="34" charset="0"/>
+              </a:rPr>
+              <a:t>th</a:t>
+            </a:r>
+            <a:r>
+              <a:rPr lang="en-US" sz="2400" dirty="0">
+                <a:latin typeface="Calibri" panose="020F0502020204030204" pitchFamily="34" charset="0"/>
+              </a:rPr>
+              <a:t> of March, c.) for 16</a:t>
+            </a:r>
+            <a:r>
+              <a:rPr lang="en-US" sz="2400" baseline="30000" dirty="0">
+                <a:latin typeface="Calibri" panose="020F0502020204030204" pitchFamily="34" charset="0"/>
+              </a:rPr>
+              <a:t>th</a:t>
+            </a:r>
+            <a:r>
+              <a:rPr lang="en-US" sz="2400" dirty="0">
+                <a:latin typeface="Calibri" panose="020F0502020204030204" pitchFamily="34" charset="0"/>
+              </a:rPr>
+              <a:t> of April.</a:t>
+            </a:r>
+          </a:p>
+        </p:txBody>
+      </p:sp>
     </p:spTree>
     <p:extLst>
       <p:ext uri="{BB962C8B-B14F-4D97-AF65-F5344CB8AC3E}">
@@ -23035,14 +23738,6 @@
   <p:clrMapOvr>
     <a:masterClrMapping/>
   </p:clrMapOvr>
-  <mc:AlternateContent xmlns:mc="http://schemas.openxmlformats.org/markup-compatibility/2006" xmlns:p14="http://schemas.microsoft.com/office/powerpoint/2010/main">
-    <mc:Choice Requires="p14">
-      <p:transition p14:dur="0"/>
-    </mc:Choice>
-    <mc:Fallback xmlns="">
-      <p:transition/>
-    </mc:Fallback>
-  </mc:AlternateContent>
 </p:sld>
 </file>
 
@@ -23079,10 +23774,9 @@
           <a:lstStyle/>
           <a:p>
             <a:r>
-              <a:rPr lang="en-US" dirty="0" smtClean="0"/>
+              <a:rPr lang="en-US" dirty="0"/>
               <a:t>Implementation</a:t>
             </a:r>
-            <a:endParaRPr lang="en-US" dirty="0"/>
           </a:p>
         </p:txBody>
       </p:sp>
@@ -23101,7 +23795,91 @@
           <a:bodyPr/>
           <a:lstStyle/>
           <a:p>
-            <a:endParaRPr lang="en-US"/>
+            <a:r>
+              <a:rPr lang="en-US" dirty="0"/>
+              <a:t>We focus our implementation in Europe and ignore the data we have on other countries.</a:t>
+            </a:r>
+          </a:p>
+          <a:p>
+            <a:r>
+              <a:rPr lang="en-US" dirty="0"/>
+              <a:t>For visualization we use </a:t>
+            </a:r>
+            <a:r>
+              <a:rPr lang="en-US" dirty="0" err="1"/>
+              <a:t>plotly</a:t>
+            </a:r>
+            <a:r>
+              <a:rPr lang="en-US" dirty="0"/>
+              <a:t> library.</a:t>
+            </a:r>
+          </a:p>
+          <a:p>
+            <a:r>
+              <a:rPr lang="en-US" dirty="0"/>
+              <a:t>As for 2D KDE we need to reimplement a weighted 2D KDE.</a:t>
+            </a:r>
+          </a:p>
+          <a:p>
+            <a:pPr lvl="1"/>
+            <a:r>
+              <a:rPr lang="en-US" dirty="0"/>
+              <a:t>We reimplement </a:t>
+            </a:r>
+            <a:r>
+              <a:rPr lang="en-US" dirty="0" err="1"/>
+              <a:t>scipy.stat.gaussian_kde</a:t>
+            </a:r>
+            <a:r>
+              <a:rPr lang="en-US" dirty="0"/>
+              <a:t> to weighted </a:t>
+            </a:r>
+            <a:r>
+              <a:rPr lang="en-US" dirty="0" err="1"/>
+              <a:t>kde</a:t>
+            </a:r>
+            <a:endParaRPr lang="en-US" dirty="0"/>
+          </a:p>
+          <a:p>
+            <a:pPr lvl="1"/>
+            <a:r>
+              <a:rPr lang="en-US" dirty="0"/>
+              <a:t>For comparison we also use </a:t>
+            </a:r>
+            <a:r>
+              <a:rPr lang="en-US" dirty="0" err="1"/>
+              <a:t>kdeplot</a:t>
+            </a:r>
+            <a:r>
+              <a:rPr lang="en-US" dirty="0"/>
+              <a:t> from seaborn package</a:t>
+            </a:r>
+          </a:p>
+          <a:p>
+            <a:r>
+              <a:rPr lang="en-US" dirty="0"/>
+              <a:t>We might need to use Gaussian Kernel instead of </a:t>
+            </a:r>
+            <a:r>
+              <a:rPr lang="en-US" dirty="0" err="1"/>
+              <a:t>Triweight</a:t>
+            </a:r>
+            <a:r>
+              <a:rPr lang="en-US" dirty="0"/>
+              <a:t> Kernel because there are much more information for 2D Gaussian KDE.</a:t>
+            </a:r>
+          </a:p>
+          <a:p>
+            <a:endParaRPr lang="en-US" dirty="0"/>
+          </a:p>
+          <a:p>
+            <a:endParaRPr lang="en-US" dirty="0"/>
+          </a:p>
+          <a:p>
+            <a:pPr marL="0" indent="0">
+              <a:buNone/>
+            </a:pPr>
+            <a:endParaRPr lang="en-US" dirty="0"/>
           </a:p>
         </p:txBody>
       </p:sp>
@@ -23124,8 +23902,8 @@
               <a:defRPr/>
             </a:pPr>
             <a:r>
-              <a:rPr lang="de-AT" smtClean="0"/>
-              <a:t>Enter your name here</a:t>
+              <a:rPr lang="de-AT" dirty="0"/>
+              <a:t>Arlind Avdullahi, Princ Mullatahiri</a:t>
             </a:r>
           </a:p>
           <a:p>
@@ -23175,14 +23953,6 @@
   <p:clrMapOvr>
     <a:masterClrMapping/>
   </p:clrMapOvr>
-  <mc:AlternateContent xmlns:mc="http://schemas.openxmlformats.org/markup-compatibility/2006" xmlns:p14="http://schemas.microsoft.com/office/powerpoint/2010/main">
-    <mc:Choice Requires="p14">
-      <p:transition p14:dur="0"/>
-    </mc:Choice>
-    <mc:Fallback xmlns="">
-      <p:transition/>
-    </mc:Fallback>
-  </mc:AlternateContent>
 </p:sld>
 </file>
 
@@ -23219,10 +23989,9 @@
           <a:lstStyle/>
           <a:p>
             <a:r>
-              <a:rPr lang="en-US" dirty="0" smtClean="0"/>
+              <a:rPr lang="en-US" dirty="0"/>
               <a:t>Group Name</a:t>
             </a:r>
-            <a:endParaRPr lang="en-US" dirty="0"/>
           </a:p>
         </p:txBody>
       </p:sp>
@@ -23245,8 +24014,44 @@
               <a:buNone/>
             </a:pPr>
             <a:r>
-              <a:rPr lang="en-US" dirty="0" smtClean="0"/>
-              <a:t>Authors</a:t>
+              <a:rPr lang="en-US" dirty="0" err="1"/>
+              <a:t>Seokyeon</a:t>
+            </a:r>
+            <a:r>
+              <a:rPr lang="en-US" dirty="0"/>
+              <a:t> Kim, </a:t>
+            </a:r>
+            <a:r>
+              <a:rPr lang="en-US" dirty="0" err="1"/>
+              <a:t>Seongmin</a:t>
+            </a:r>
+            <a:r>
+              <a:rPr lang="en-US" dirty="0"/>
+              <a:t> </a:t>
+            </a:r>
+            <a:r>
+              <a:rPr lang="en-US" dirty="0" err="1"/>
+              <a:t>Jeong</a:t>
+            </a:r>
+            <a:r>
+              <a:rPr lang="en-US" dirty="0"/>
+              <a:t>, </a:t>
+            </a:r>
+            <a:r>
+              <a:rPr lang="en-US" dirty="0" err="1"/>
+              <a:t>Insoo</a:t>
+            </a:r>
+            <a:r>
+              <a:rPr lang="en-US" dirty="0"/>
+              <a:t> Woo, Yun Jang, Ross </a:t>
+            </a:r>
+            <a:r>
+              <a:rPr lang="en-US" dirty="0" err="1"/>
+              <a:t>Maciejewski</a:t>
+            </a:r>
+            <a:r>
+              <a:rPr lang="en-US" dirty="0"/>
+              <a:t>, David S. Ebert</a:t>
             </a:r>
           </a:p>
           <a:p>
@@ -23254,27 +24059,18 @@
               <a:buNone/>
             </a:pPr>
             <a:r>
-              <a:rPr lang="en-US" sz="3600" b="1" dirty="0" smtClean="0"/>
-              <a:t>Title</a:t>
+              <a:rPr lang="en-US" sz="3600" b="1" dirty="0"/>
+              <a:t>Data Flow Analysis and Visualization for Spatiotemporal Statistical Data without Trajectory Information</a:t>
             </a:r>
-            <a:endParaRPr lang="en-US" b="1" dirty="0" smtClean="0"/>
+            <a:endParaRPr lang="en-US" b="1" dirty="0"/>
           </a:p>
           <a:p>
             <a:pPr marL="0" indent="0">
               <a:buNone/>
             </a:pPr>
             <a:r>
-              <a:rPr lang="en-US" dirty="0" smtClean="0"/>
-              <a:t>Journal / Proceedings (+ Issue / Volume) </a:t>
-            </a:r>
-          </a:p>
-          <a:p>
-            <a:pPr marL="0" indent="0">
-              <a:buNone/>
-            </a:pPr>
-            <a:r>
-              <a:rPr lang="en-US" dirty="0" smtClean="0"/>
-              <a:t>Year</a:t>
+              <a:rPr lang="en-US" dirty="0"/>
+              <a:t>2017</a:t>
             </a:r>
           </a:p>
           <a:p>
@@ -23304,8 +24100,8 @@
               <a:defRPr/>
             </a:pPr>
             <a:r>
-              <a:rPr lang="de-AT" smtClean="0"/>
-              <a:t>Enter your name here</a:t>
+              <a:rPr lang="de-AT" dirty="0"/>
+              <a:t>Arlind Avdullahi, Princ Mullatahiri</a:t>
             </a:r>
           </a:p>
           <a:p>
@@ -23355,14 +24151,6 @@
   <p:clrMapOvr>
     <a:masterClrMapping/>
   </p:clrMapOvr>
-  <mc:AlternateContent xmlns:mc="http://schemas.openxmlformats.org/markup-compatibility/2006" xmlns:p14="http://schemas.microsoft.com/office/powerpoint/2010/main">
-    <mc:Choice Requires="p14">
-      <p:transition p14:dur="0"/>
-    </mc:Choice>
-    <mc:Fallback xmlns="">
-      <p:transition/>
-    </mc:Fallback>
-  </mc:AlternateContent>
 </p:sld>
 </file>
 

</xml_diff>